<commit_message>
added RFFE individual screenshot to ppt
</commit_message>
<xml_diff>
--- a/CS347 Final Project.pptx
+++ b/CS347 Final Project.pptx
@@ -23,23 +23,24 @@
     <p:sldId id="268" r:id="rId18"/>
     <p:sldId id="269" r:id="rId19"/>
     <p:sldId id="270" r:id="rId20"/>
+    <p:sldId id="271" r:id="rId21"/>
   </p:sldIdLst>
   <p:sldSz cy="5143500" cx="9144000"/>
   <p:notesSz cx="6858000" cy="9144000"/>
   <p:embeddedFontLst>
     <p:embeddedFont>
       <p:font typeface="Playfair Display"/>
-      <p:regular r:id="rId21"/>
-      <p:bold r:id="rId22"/>
-      <p:italic r:id="rId23"/>
-      <p:boldItalic r:id="rId24"/>
+      <p:regular r:id="rId22"/>
+      <p:bold r:id="rId23"/>
+      <p:italic r:id="rId24"/>
+      <p:boldItalic r:id="rId25"/>
     </p:embeddedFont>
     <p:embeddedFont>
       <p:font typeface="Lato"/>
-      <p:regular r:id="rId25"/>
-      <p:bold r:id="rId26"/>
-      <p:italic r:id="rId27"/>
-      <p:boldItalic r:id="rId28"/>
+      <p:regular r:id="rId26"/>
+      <p:bold r:id="rId27"/>
+      <p:italic r:id="rId28"/>
+      <p:boldItalic r:id="rId29"/>
     </p:embeddedFont>
   </p:embeddedFontLst>
   <p:defaultTextStyle>
@@ -620,7 +621,7 @@
   <p:cSld>
     <p:spTree>
       <p:nvGrpSpPr>
-        <p:cNvPr id="108" name="Shape 108"/>
+        <p:cNvPr id="107" name="Shape 107"/>
         <p:cNvGrpSpPr/>
         <p:nvPr/>
       </p:nvGrpSpPr>
@@ -634,7 +635,7 @@
       </p:grpSpPr>
       <p:sp>
         <p:nvSpPr>
-          <p:cNvPr id="109" name="Shape 109"/>
+          <p:cNvPr id="108" name="Shape 108"/>
           <p:cNvSpPr/>
           <p:nvPr>
             <p:ph idx="2" type="sldImg"/>
@@ -678,7 +679,7 @@
       </p:sp>
       <p:sp>
         <p:nvSpPr>
-          <p:cNvPr id="110" name="Shape 110"/>
+          <p:cNvPr id="109" name="Shape 109"/>
           <p:cNvSpPr txBox="1"/>
           <p:nvPr>
             <p:ph idx="1" type="body"/>
@@ -725,7 +726,7 @@
   <p:cSld>
     <p:spTree>
       <p:nvGrpSpPr>
-        <p:cNvPr id="114" name="Shape 114"/>
+        <p:cNvPr id="113" name="Shape 113"/>
         <p:cNvGrpSpPr/>
         <p:nvPr/>
       </p:nvGrpSpPr>
@@ -739,7 +740,7 @@
       </p:grpSpPr>
       <p:sp>
         <p:nvSpPr>
-          <p:cNvPr id="115" name="Shape 115"/>
+          <p:cNvPr id="114" name="Shape 114"/>
           <p:cNvSpPr/>
           <p:nvPr>
             <p:ph idx="2" type="sldImg"/>
@@ -783,7 +784,7 @@
       </p:sp>
       <p:sp>
         <p:nvSpPr>
-          <p:cNvPr id="116" name="Shape 116"/>
+          <p:cNvPr id="115" name="Shape 115"/>
           <p:cNvSpPr txBox="1"/>
           <p:nvPr>
             <p:ph idx="1" type="body"/>
@@ -935,7 +936,7 @@
   <p:cSld>
     <p:spTree>
       <p:nvGrpSpPr>
-        <p:cNvPr id="126" name="Shape 126"/>
+        <p:cNvPr id="124" name="Shape 124"/>
         <p:cNvGrpSpPr/>
         <p:nvPr/>
       </p:nvGrpSpPr>
@@ -949,7 +950,7 @@
       </p:grpSpPr>
       <p:sp>
         <p:nvSpPr>
-          <p:cNvPr id="127" name="Shape 127"/>
+          <p:cNvPr id="125" name="Shape 125"/>
           <p:cNvSpPr/>
           <p:nvPr>
             <p:ph idx="2" type="sldImg"/>
@@ -993,7 +994,7 @@
       </p:sp>
       <p:sp>
         <p:nvSpPr>
-          <p:cNvPr id="128" name="Shape 128"/>
+          <p:cNvPr id="126" name="Shape 126"/>
           <p:cNvSpPr txBox="1"/>
           <p:nvPr>
             <p:ph idx="1" type="body"/>
@@ -1099,6 +1100,111 @@
       <p:sp>
         <p:nvSpPr>
           <p:cNvPr id="133" name="Shape 133"/>
+          <p:cNvSpPr txBox="1"/>
+          <p:nvPr>
+            <p:ph idx="1" type="body"/>
+          </p:nvPr>
+        </p:nvSpPr>
+        <p:spPr>
+          <a:xfrm>
+            <a:off x="685800" y="4343400"/>
+            <a:ext cx="5486399" cy="4114800"/>
+          </a:xfrm>
+          <a:prstGeom prst="rect">
+            <a:avLst/>
+          </a:prstGeom>
+        </p:spPr>
+        <p:txBody>
+          <a:bodyPr anchorCtr="0" anchor="t" bIns="91425" lIns="91425" rIns="91425" tIns="91425">
+            <a:noAutofit/>
+          </a:bodyPr>
+          <a:lstStyle/>
+          <a:p>
+            <a:pPr>
+              <a:spcBef>
+                <a:spcPts val="0"/>
+              </a:spcBef>
+              <a:buNone/>
+            </a:pPr>
+            <a:r>
+              <a:t/>
+            </a:r>
+            <a:endParaRPr/>
+          </a:p>
+        </p:txBody>
+      </p:sp>
+    </p:spTree>
+  </p:cSld>
+  <p:clrMapOvr>
+    <a:masterClrMapping/>
+  </p:clrMapOvr>
+</p:notes>
+</file>
+
+<file path=ppt/notesSlides/notesSlide16.xml><?xml version="1.0" encoding="utf-8"?>
+<p:notes xmlns:a="http://schemas.openxmlformats.org/drawingml/2006/main" xmlns:r="http://schemas.openxmlformats.org/officeDocument/2006/relationships" xmlns:mc="http://schemas.openxmlformats.org/markup-compatibility/2006" xmlns:mv="urn:schemas-microsoft-com:mac:vml" xmlns:p="http://schemas.openxmlformats.org/presentationml/2006/main" xmlns:c="http://schemas.openxmlformats.org/drawingml/2006/chart" xmlns:dgm="http://schemas.openxmlformats.org/drawingml/2006/diagram" xmlns:o="urn:schemas-microsoft-com:office:office" xmlns:v="urn:schemas-microsoft-com:vml" xmlns:pvml="urn:schemas-microsoft-com:office:powerpoint" xmlns:com="http://schemas.openxmlformats.org/drawingml/2006/compatibility" xmlns:p14="http://schemas.microsoft.com/office/powerpoint/2010/main" showMasterPhAnim="0" showMasterSp="0">
+  <p:cSld>
+    <p:spTree>
+      <p:nvGrpSpPr>
+        <p:cNvPr id="136" name="Shape 136"/>
+        <p:cNvGrpSpPr/>
+        <p:nvPr/>
+      </p:nvGrpSpPr>
+      <p:grpSpPr>
+        <a:xfrm>
+          <a:off x="0" y="0"/>
+          <a:ext cx="0" cy="0"/>
+          <a:chOff x="0" y="0"/>
+          <a:chExt cx="0" cy="0"/>
+        </a:xfrm>
+      </p:grpSpPr>
+      <p:sp>
+        <p:nvSpPr>
+          <p:cNvPr id="137" name="Shape 137"/>
+          <p:cNvSpPr/>
+          <p:nvPr>
+            <p:ph idx="2" type="sldImg"/>
+          </p:nvPr>
+        </p:nvSpPr>
+        <p:spPr>
+          <a:xfrm>
+            <a:off x="381300" y="685800"/>
+            <a:ext cx="6096000" cy="3429000"/>
+          </a:xfrm>
+          <a:custGeom>
+            <a:pathLst>
+              <a:path extrusionOk="0" h="120000" w="120000">
+                <a:moveTo>
+                  <a:pt x="0" y="0"/>
+                </a:moveTo>
+                <a:lnTo>
+                  <a:pt x="120000" y="0"/>
+                </a:lnTo>
+                <a:lnTo>
+                  <a:pt x="120000" y="120000"/>
+                </a:lnTo>
+                <a:lnTo>
+                  <a:pt x="0" y="120000"/>
+                </a:lnTo>
+                <a:close/>
+              </a:path>
+            </a:pathLst>
+          </a:custGeom>
+          <a:noFill/>
+          <a:ln cap="flat" cmpd="sng" w="9525">
+            <a:solidFill>
+              <a:srgbClr val="000000"/>
+            </a:solidFill>
+            <a:prstDash val="solid"/>
+            <a:round/>
+            <a:headEnd len="med" w="med" type="none"/>
+            <a:tailEnd len="med" w="med" type="none"/>
+          </a:ln>
+        </p:spPr>
+      </p:sp>
+      <p:sp>
+        <p:nvSpPr>
+          <p:cNvPr id="138" name="Shape 138"/>
           <p:cNvSpPr txBox="1"/>
           <p:nvPr>
             <p:ph idx="1" type="body"/>
@@ -6227,8 +6333,8 @@
         </p:blipFill>
         <p:spPr>
           <a:xfrm>
-            <a:off x="0" y="1100431"/>
-            <a:ext cx="9143999" cy="3558086"/>
+            <a:off x="0" y="355674"/>
+            <a:ext cx="9144000" cy="4432150"/>
           </a:xfrm>
           <a:prstGeom prst="rect">
             <a:avLst/>
@@ -6239,42 +6345,6 @@
           </a:ln>
         </p:spPr>
       </p:pic>
-      <p:sp>
-        <p:nvSpPr>
-          <p:cNvPr id="107" name="Shape 107"/>
-          <p:cNvSpPr txBox="1"/>
-          <p:nvPr>
-            <p:ph type="title"/>
-          </p:nvPr>
-        </p:nvSpPr>
-        <p:spPr>
-          <a:xfrm>
-            <a:off x="311700" y="391350"/>
-            <a:ext cx="8520599" cy="626100"/>
-          </a:xfrm>
-          <a:prstGeom prst="rect">
-            <a:avLst/>
-          </a:prstGeom>
-        </p:spPr>
-        <p:txBody>
-          <a:bodyPr anchorCtr="0" anchor="t" bIns="91425" lIns="91425" rIns="91425" tIns="91425">
-            <a:noAutofit/>
-          </a:bodyPr>
-          <a:lstStyle/>
-          <a:p>
-            <a:pPr>
-              <a:spcBef>
-                <a:spcPts val="0"/>
-              </a:spcBef>
-              <a:buNone/>
-            </a:pPr>
-            <a:r>
-              <a:rPr lang="en"/>
-              <a:t>Part II Conceptual Model</a:t>
-            </a:r>
-          </a:p>
-        </p:txBody>
-      </p:sp>
     </p:spTree>
   </p:cSld>
   <p:clrMapOvr>
@@ -6291,7 +6361,7 @@
   <p:cSld>
     <p:spTree>
       <p:nvGrpSpPr>
-        <p:cNvPr id="111" name="Shape 111"/>
+        <p:cNvPr id="110" name="Shape 110"/>
         <p:cNvGrpSpPr/>
         <p:nvPr/>
       </p:nvGrpSpPr>
@@ -6303,6 +6373,34 @@
           <a:chExt cx="0" cy="0"/>
         </a:xfrm>
       </p:grpSpPr>
+      <p:pic>
+        <p:nvPicPr>
+          <p:cNvPr id="111" name="Shape 111"/>
+          <p:cNvPicPr preferRelativeResize="0"/>
+          <p:nvPr/>
+        </p:nvPicPr>
+        <p:blipFill>
+          <a:blip r:embed="rId3">
+            <a:alphaModFix/>
+          </a:blip>
+          <a:stretch>
+            <a:fillRect/>
+          </a:stretch>
+        </p:blipFill>
+        <p:spPr>
+          <a:xfrm>
+            <a:off x="0" y="1100431"/>
+            <a:ext cx="9143999" cy="3558086"/>
+          </a:xfrm>
+          <a:prstGeom prst="rect">
+            <a:avLst/>
+          </a:prstGeom>
+          <a:noFill/>
+          <a:ln>
+            <a:noFill/>
+          </a:ln>
+        </p:spPr>
+      </p:pic>
       <p:sp>
         <p:nvSpPr>
           <p:cNvPr id="112" name="Shape 112"/>
@@ -6334,55 +6432,7 @@
             </a:pPr>
             <a:r>
               <a:rPr lang="en"/>
-              <a:t>Part II Description and screenshots</a:t>
-            </a:r>
-          </a:p>
-        </p:txBody>
-      </p:sp>
-      <p:sp>
-        <p:nvSpPr>
-          <p:cNvPr id="113" name="Shape 113"/>
-          <p:cNvSpPr txBox="1"/>
-          <p:nvPr>
-            <p:ph idx="1" type="body"/>
-          </p:nvPr>
-        </p:nvSpPr>
-        <p:spPr>
-          <a:xfrm>
-            <a:off x="311700" y="1152475"/>
-            <a:ext cx="8520599" cy="3416400"/>
-          </a:xfrm>
-          <a:prstGeom prst="rect">
-            <a:avLst/>
-          </a:prstGeom>
-        </p:spPr>
-        <p:txBody>
-          <a:bodyPr anchorCtr="0" anchor="t" bIns="91425" lIns="91425" rIns="91425" tIns="91425">
-            <a:noAutofit/>
-          </a:bodyPr>
-          <a:lstStyle/>
-          <a:p>
-            <a:pPr rtl="0">
-              <a:spcBef>
-                <a:spcPts val="0"/>
-              </a:spcBef>
-              <a:buNone/>
-            </a:pPr>
-            <a:r>
-              <a:rPr lang="en"/>
-              <a:t>Part II of our project is meant to act like a beverage menu depending on season. </a:t>
-            </a:r>
-          </a:p>
-          <a:p>
-            <a:pPr>
-              <a:spcBef>
-                <a:spcPts val="0"/>
-              </a:spcBef>
-              <a:buNone/>
-            </a:pPr>
-            <a:r>
-              <a:rPr lang="en"/>
-              <a:t>Seasonal drinks are displayed with prices, descriptions, ingredients, etc. </a:t>
+              <a:t>Part II Conceptual Model</a:t>
             </a:r>
           </a:p>
         </p:txBody>
@@ -6403,7 +6453,7 @@
   <p:cSld>
     <p:spTree>
       <p:nvGrpSpPr>
-        <p:cNvPr id="117" name="Shape 117"/>
+        <p:cNvPr id="116" name="Shape 116"/>
         <p:cNvGrpSpPr/>
         <p:nvPr/>
       </p:nvGrpSpPr>
@@ -6415,34 +6465,90 @@
           <a:chExt cx="0" cy="0"/>
         </a:xfrm>
       </p:grpSpPr>
-      <p:pic>
-        <p:nvPicPr>
-          <p:cNvPr id="118" name="Shape 118"/>
-          <p:cNvPicPr preferRelativeResize="0"/>
-          <p:nvPr/>
-        </p:nvPicPr>
-        <p:blipFill>
-          <a:blip r:embed="rId3">
-            <a:alphaModFix/>
-          </a:blip>
-          <a:stretch>
-            <a:fillRect/>
-          </a:stretch>
-        </p:blipFill>
-        <p:spPr>
-          <a:xfrm>
-            <a:off x="0" y="560916"/>
-            <a:ext cx="9144000" cy="4021666"/>
+      <p:sp>
+        <p:nvSpPr>
+          <p:cNvPr id="117" name="Shape 117"/>
+          <p:cNvSpPr txBox="1"/>
+          <p:nvPr>
+            <p:ph type="title"/>
+          </p:nvPr>
+        </p:nvSpPr>
+        <p:spPr>
+          <a:xfrm>
+            <a:off x="311700" y="391350"/>
+            <a:ext cx="8520599" cy="626100"/>
           </a:xfrm>
           <a:prstGeom prst="rect">
             <a:avLst/>
           </a:prstGeom>
-          <a:noFill/>
-          <a:ln>
-            <a:noFill/>
-          </a:ln>
-        </p:spPr>
-      </p:pic>
+        </p:spPr>
+        <p:txBody>
+          <a:bodyPr anchorCtr="0" anchor="t" bIns="91425" lIns="91425" rIns="91425" tIns="91425">
+            <a:noAutofit/>
+          </a:bodyPr>
+          <a:lstStyle/>
+          <a:p>
+            <a:pPr>
+              <a:spcBef>
+                <a:spcPts val="0"/>
+              </a:spcBef>
+              <a:buNone/>
+            </a:pPr>
+            <a:r>
+              <a:rPr lang="en"/>
+              <a:t>Part II Description and screenshots</a:t>
+            </a:r>
+          </a:p>
+        </p:txBody>
+      </p:sp>
+      <p:sp>
+        <p:nvSpPr>
+          <p:cNvPr id="118" name="Shape 118"/>
+          <p:cNvSpPr txBox="1"/>
+          <p:nvPr>
+            <p:ph idx="1" type="body"/>
+          </p:nvPr>
+        </p:nvSpPr>
+        <p:spPr>
+          <a:xfrm>
+            <a:off x="311700" y="1152475"/>
+            <a:ext cx="8520599" cy="3416400"/>
+          </a:xfrm>
+          <a:prstGeom prst="rect">
+            <a:avLst/>
+          </a:prstGeom>
+        </p:spPr>
+        <p:txBody>
+          <a:bodyPr anchorCtr="0" anchor="t" bIns="91425" lIns="91425" rIns="91425" tIns="91425">
+            <a:noAutofit/>
+          </a:bodyPr>
+          <a:lstStyle/>
+          <a:p>
+            <a:pPr rtl="0">
+              <a:spcBef>
+                <a:spcPts val="0"/>
+              </a:spcBef>
+              <a:buNone/>
+            </a:pPr>
+            <a:r>
+              <a:rPr lang="en"/>
+              <a:t>Part II of our project is meant to act like a beverage menu depending on season. </a:t>
+            </a:r>
+          </a:p>
+          <a:p>
+            <a:pPr>
+              <a:spcBef>
+                <a:spcPts val="0"/>
+              </a:spcBef>
+              <a:buNone/>
+            </a:pPr>
+            <a:r>
+              <a:rPr lang="en"/>
+              <a:t>Seasonal drinks are displayed with prices, descriptions, ingredients, etc. </a:t>
+            </a:r>
+          </a:p>
+        </p:txBody>
+      </p:sp>
     </p:spTree>
   </p:cSld>
   <p:clrMapOvr>
@@ -6471,81 +6577,9 @@
           <a:chExt cx="0" cy="0"/>
         </a:xfrm>
       </p:grpSpPr>
-      <p:sp>
-        <p:nvSpPr>
-          <p:cNvPr id="123" name="Shape 123"/>
-          <p:cNvSpPr txBox="1"/>
-          <p:nvPr>
-            <p:ph type="title"/>
-          </p:nvPr>
-        </p:nvSpPr>
-        <p:spPr>
-          <a:xfrm>
-            <a:off x="311700" y="391350"/>
-            <a:ext cx="8520599" cy="626100"/>
-          </a:xfrm>
-          <a:prstGeom prst="rect">
-            <a:avLst/>
-          </a:prstGeom>
-        </p:spPr>
-        <p:txBody>
-          <a:bodyPr anchorCtr="0" anchor="t" bIns="91425" lIns="91425" rIns="91425" tIns="91425">
-            <a:noAutofit/>
-          </a:bodyPr>
-          <a:lstStyle/>
-          <a:p>
-            <a:pPr>
-              <a:spcBef>
-                <a:spcPts val="0"/>
-              </a:spcBef>
-              <a:buNone/>
-            </a:pPr>
-            <a:r>
-              <a:t/>
-            </a:r>
-            <a:endParaRPr/>
-          </a:p>
-        </p:txBody>
-      </p:sp>
-      <p:sp>
-        <p:nvSpPr>
-          <p:cNvPr id="124" name="Shape 124"/>
-          <p:cNvSpPr txBox="1"/>
-          <p:nvPr>
-            <p:ph idx="1" type="body"/>
-          </p:nvPr>
-        </p:nvSpPr>
-        <p:spPr>
-          <a:xfrm>
-            <a:off x="311700" y="1152475"/>
-            <a:ext cx="8520599" cy="3416400"/>
-          </a:xfrm>
-          <a:prstGeom prst="rect">
-            <a:avLst/>
-          </a:prstGeom>
-        </p:spPr>
-        <p:txBody>
-          <a:bodyPr anchorCtr="0" anchor="t" bIns="91425" lIns="91425" rIns="91425" tIns="91425">
-            <a:noAutofit/>
-          </a:bodyPr>
-          <a:lstStyle/>
-          <a:p>
-            <a:pPr>
-              <a:spcBef>
-                <a:spcPts val="0"/>
-              </a:spcBef>
-              <a:buNone/>
-            </a:pPr>
-            <a:r>
-              <a:t/>
-            </a:r>
-            <a:endParaRPr/>
-          </a:p>
-        </p:txBody>
-      </p:sp>
       <p:pic>
         <p:nvPicPr>
-          <p:cNvPr id="125" name="Shape 125"/>
+          <p:cNvPr id="123" name="Shape 123"/>
           <p:cNvPicPr preferRelativeResize="0"/>
           <p:nvPr/>
         </p:nvPicPr>
@@ -6559,8 +6593,8 @@
         </p:blipFill>
         <p:spPr>
           <a:xfrm>
-            <a:off x="363687" y="205724"/>
-            <a:ext cx="8416625" cy="4732049"/>
+            <a:off x="0" y="560916"/>
+            <a:ext cx="9144000" cy="4021666"/>
           </a:xfrm>
           <a:prstGeom prst="rect">
             <a:avLst/>
@@ -6587,7 +6621,7 @@
   <p:cSld>
     <p:spTree>
       <p:nvGrpSpPr>
-        <p:cNvPr id="129" name="Shape 129"/>
+        <p:cNvPr id="127" name="Shape 127"/>
         <p:cNvGrpSpPr/>
         <p:nvPr/>
       </p:nvGrpSpPr>
@@ -6601,7 +6635,135 @@
       </p:grpSpPr>
       <p:sp>
         <p:nvSpPr>
+          <p:cNvPr id="128" name="Shape 128"/>
+          <p:cNvSpPr txBox="1"/>
+          <p:nvPr>
+            <p:ph type="title"/>
+          </p:nvPr>
+        </p:nvSpPr>
+        <p:spPr>
+          <a:xfrm>
+            <a:off x="311700" y="391350"/>
+            <a:ext cx="8520599" cy="626100"/>
+          </a:xfrm>
+          <a:prstGeom prst="rect">
+            <a:avLst/>
+          </a:prstGeom>
+        </p:spPr>
+        <p:txBody>
+          <a:bodyPr anchorCtr="0" anchor="t" bIns="91425" lIns="91425" rIns="91425" tIns="91425">
+            <a:noAutofit/>
+          </a:bodyPr>
+          <a:lstStyle/>
+          <a:p>
+            <a:pPr>
+              <a:spcBef>
+                <a:spcPts val="0"/>
+              </a:spcBef>
+              <a:buNone/>
+            </a:pPr>
+            <a:r>
+              <a:t/>
+            </a:r>
+            <a:endParaRPr/>
+          </a:p>
+        </p:txBody>
+      </p:sp>
+      <p:sp>
+        <p:nvSpPr>
+          <p:cNvPr id="129" name="Shape 129"/>
+          <p:cNvSpPr txBox="1"/>
+          <p:nvPr>
+            <p:ph idx="1" type="body"/>
+          </p:nvPr>
+        </p:nvSpPr>
+        <p:spPr>
+          <a:xfrm>
+            <a:off x="311700" y="1152475"/>
+            <a:ext cx="8520599" cy="3416400"/>
+          </a:xfrm>
+          <a:prstGeom prst="rect">
+            <a:avLst/>
+          </a:prstGeom>
+        </p:spPr>
+        <p:txBody>
+          <a:bodyPr anchorCtr="0" anchor="t" bIns="91425" lIns="91425" rIns="91425" tIns="91425">
+            <a:noAutofit/>
+          </a:bodyPr>
+          <a:lstStyle/>
+          <a:p>
+            <a:pPr>
+              <a:spcBef>
+                <a:spcPts val="0"/>
+              </a:spcBef>
+              <a:buNone/>
+            </a:pPr>
+            <a:r>
+              <a:t/>
+            </a:r>
+            <a:endParaRPr/>
+          </a:p>
+        </p:txBody>
+      </p:sp>
+      <p:pic>
+        <p:nvPicPr>
           <p:cNvPr id="130" name="Shape 130"/>
+          <p:cNvPicPr preferRelativeResize="0"/>
+          <p:nvPr/>
+        </p:nvPicPr>
+        <p:blipFill>
+          <a:blip r:embed="rId3">
+            <a:alphaModFix/>
+          </a:blip>
+          <a:stretch>
+            <a:fillRect/>
+          </a:stretch>
+        </p:blipFill>
+        <p:spPr>
+          <a:xfrm>
+            <a:off x="0" y="205725"/>
+            <a:ext cx="9144000" cy="4732049"/>
+          </a:xfrm>
+          <a:prstGeom prst="rect">
+            <a:avLst/>
+          </a:prstGeom>
+          <a:noFill/>
+          <a:ln>
+            <a:noFill/>
+          </a:ln>
+        </p:spPr>
+      </p:pic>
+    </p:spTree>
+  </p:cSld>
+  <p:clrMapOvr>
+    <a:masterClrMapping/>
+  </p:clrMapOvr>
+  <p:transition spd="slow">
+    <p:cut/>
+  </p:transition>
+</p:sld>
+</file>
+
+<file path=ppt/slides/slide16.xml><?xml version="1.0" encoding="utf-8"?>
+<p:sld xmlns:a="http://schemas.openxmlformats.org/drawingml/2006/main" xmlns:r="http://schemas.openxmlformats.org/officeDocument/2006/relationships" xmlns:mc="http://schemas.openxmlformats.org/markup-compatibility/2006" xmlns:mv="urn:schemas-microsoft-com:mac:vml" xmlns:p="http://schemas.openxmlformats.org/presentationml/2006/main" xmlns:c="http://schemas.openxmlformats.org/drawingml/2006/chart" xmlns:dgm="http://schemas.openxmlformats.org/drawingml/2006/diagram" xmlns:o="urn:schemas-microsoft-com:office:office" xmlns:v="urn:schemas-microsoft-com:vml" xmlns:pvml="urn:schemas-microsoft-com:office:powerpoint" xmlns:com="http://schemas.openxmlformats.org/drawingml/2006/compatibility" xmlns:p14="http://schemas.microsoft.com/office/powerpoint/2010/main">
+  <p:cSld>
+    <p:spTree>
+      <p:nvGrpSpPr>
+        <p:cNvPr id="134" name="Shape 134"/>
+        <p:cNvGrpSpPr/>
+        <p:nvPr/>
+      </p:nvGrpSpPr>
+      <p:grpSpPr>
+        <a:xfrm>
+          <a:off x="0" y="0"/>
+          <a:ext cx="0" cy="0"/>
+          <a:chOff x="0" y="0"/>
+          <a:chExt cx="0" cy="0"/>
+        </a:xfrm>
+      </p:grpSpPr>
+      <p:sp>
+        <p:nvSpPr>
+          <p:cNvPr id="135" name="Shape 135"/>
           <p:cNvSpPr txBox="1"/>
           <p:nvPr>
             <p:ph type="title"/>
@@ -7108,6 +7270,285 @@
 </file>
 
 <file path=ppt/theme/theme1.xml><?xml version="1.0" encoding="utf-8"?>
+<a:theme xmlns:a="http://schemas.openxmlformats.org/drawingml/2006/main" xmlns:r="http://schemas.openxmlformats.org/officeDocument/2006/relationships" name="coral">
+  <a:themeElements>
+    <a:clrScheme name="Coral">
+      <a:dk1>
+        <a:srgbClr val="F55E61"/>
+      </a:dk1>
+      <a:lt1>
+        <a:srgbClr val="FFFFFF"/>
+      </a:lt1>
+      <a:dk2>
+        <a:srgbClr val="5E696C"/>
+      </a:dk2>
+      <a:lt2>
+        <a:srgbClr val="BFC7CA"/>
+      </a:lt2>
+      <a:accent1>
+        <a:srgbClr val="1E2D31"/>
+      </a:accent1>
+      <a:accent2>
+        <a:srgbClr val="273C42"/>
+      </a:accent2>
+      <a:accent3>
+        <a:srgbClr val="83D061"/>
+      </a:accent3>
+      <a:accent4>
+        <a:srgbClr val="F6CD4C"/>
+      </a:accent4>
+      <a:accent5>
+        <a:srgbClr val="AF4345"/>
+      </a:accent5>
+      <a:accent6>
+        <a:srgbClr val="F58F8F"/>
+      </a:accent6>
+      <a:hlink>
+        <a:srgbClr val="AF4345"/>
+      </a:hlink>
+      <a:folHlink>
+        <a:srgbClr val="AF4345"/>
+      </a:folHlink>
+    </a:clrScheme>
+    <a:fontScheme name="Office">
+      <a:majorFont>
+        <a:latin typeface="Arial"/>
+        <a:ea typeface=""/>
+        <a:cs typeface=""/>
+        <a:font script="Jpan" typeface="ＭＳ Ｐゴシック"/>
+        <a:font script="Hang" typeface="맑은 고딕"/>
+        <a:font script="Hans" typeface="宋体"/>
+        <a:font script="Hant" typeface="新細明體"/>
+        <a:font script="Arab" typeface="Times New Roman"/>
+        <a:font script="Hebr" typeface="Times New Roman"/>
+        <a:font script="Thai" typeface="Angsana New"/>
+        <a:font script="Ethi" typeface="Nyala"/>
+        <a:font script="Beng" typeface="Vrinda"/>
+        <a:font script="Gujr" typeface="Shruti"/>
+        <a:font script="Khmr" typeface="MoolBoran"/>
+        <a:font script="Knda" typeface="Tunga"/>
+        <a:font script="Guru" typeface="Raavi"/>
+        <a:font script="Cans" typeface="Euphemia"/>
+        <a:font script="Cher" typeface="Plantagenet Cherokee"/>
+        <a:font script="Yiii" typeface="Microsoft Yi Baiti"/>
+        <a:font script="Tibt" typeface="Microsoft Himalaya"/>
+        <a:font script="Thaa" typeface="MV Boli"/>
+        <a:font script="Deva" typeface="Mangal"/>
+        <a:font script="Telu" typeface="Gautami"/>
+        <a:font script="Taml" typeface="Latha"/>
+        <a:font script="Syrc" typeface="Estrangelo Edessa"/>
+        <a:font script="Orya" typeface="Kalinga"/>
+        <a:font script="Mlym" typeface="Kartika"/>
+        <a:font script="Laoo" typeface="DokChampa"/>
+        <a:font script="Sinh" typeface="Iskoola Pota"/>
+        <a:font script="Mong" typeface="Mongolian Baiti"/>
+        <a:font script="Viet" typeface="Times New Roman"/>
+        <a:font script="Uigh" typeface="Microsoft Uighur"/>
+        <a:font script="Geor" typeface="Sylfaen"/>
+      </a:majorFont>
+      <a:minorFont>
+        <a:latin typeface="Arial"/>
+        <a:ea typeface=""/>
+        <a:cs typeface=""/>
+        <a:font script="Jpan" typeface="ＭＳ Ｐゴシック"/>
+        <a:font script="Hang" typeface="맑은 고딕"/>
+        <a:font script="Hans" typeface="宋体"/>
+        <a:font script="Hant" typeface="新細明體"/>
+        <a:font script="Arab" typeface="Arial"/>
+        <a:font script="Hebr" typeface="Arial"/>
+        <a:font script="Thai" typeface="Cordia New"/>
+        <a:font script="Ethi" typeface="Nyala"/>
+        <a:font script="Beng" typeface="Vrinda"/>
+        <a:font script="Gujr" typeface="Shruti"/>
+        <a:font script="Khmr" typeface="DaunPenh"/>
+        <a:font script="Knda" typeface="Tunga"/>
+        <a:font script="Guru" typeface="Raavi"/>
+        <a:font script="Cans" typeface="Euphemia"/>
+        <a:font script="Cher" typeface="Plantagenet Cherokee"/>
+        <a:font script="Yiii" typeface="Microsoft Yi Baiti"/>
+        <a:font script="Tibt" typeface="Microsoft Himalaya"/>
+        <a:font script="Thaa" typeface="MV Boli"/>
+        <a:font script="Deva" typeface="Mangal"/>
+        <a:font script="Telu" typeface="Gautami"/>
+        <a:font script="Taml" typeface="Latha"/>
+        <a:font script="Syrc" typeface="Estrangelo Edessa"/>
+        <a:font script="Orya" typeface="Kalinga"/>
+        <a:font script="Mlym" typeface="Kartika"/>
+        <a:font script="Laoo" typeface="DokChampa"/>
+        <a:font script="Sinh" typeface="Iskoola Pota"/>
+        <a:font script="Mong" typeface="Mongolian Baiti"/>
+        <a:font script="Viet" typeface="Arial"/>
+        <a:font script="Uigh" typeface="Microsoft Uighur"/>
+        <a:font script="Geor" typeface="Sylfaen"/>
+      </a:minorFont>
+    </a:fontScheme>
+    <a:fmtScheme name="Office">
+      <a:fillStyleLst>
+        <a:solidFill>
+          <a:schemeClr val="phClr"/>
+        </a:solidFill>
+        <a:gradFill rotWithShape="1">
+          <a:gsLst>
+            <a:gs pos="0">
+              <a:schemeClr val="phClr">
+                <a:tint val="50000"/>
+                <a:satMod val="300000"/>
+              </a:schemeClr>
+            </a:gs>
+            <a:gs pos="35000">
+              <a:schemeClr val="phClr">
+                <a:tint val="37000"/>
+                <a:satMod val="300000"/>
+              </a:schemeClr>
+            </a:gs>
+            <a:gs pos="100000">
+              <a:schemeClr val="phClr">
+                <a:tint val="15000"/>
+                <a:satMod val="350000"/>
+              </a:schemeClr>
+            </a:gs>
+          </a:gsLst>
+          <a:lin ang="16200000" scaled="1"/>
+        </a:gradFill>
+        <a:gradFill rotWithShape="1">
+          <a:gsLst>
+            <a:gs pos="0">
+              <a:schemeClr val="phClr">
+                <a:tint val="100000"/>
+                <a:shade val="100000"/>
+                <a:satMod val="130000"/>
+              </a:schemeClr>
+            </a:gs>
+            <a:gs pos="100000">
+              <a:schemeClr val="phClr">
+                <a:tint val="50000"/>
+                <a:shade val="100000"/>
+                <a:satMod val="350000"/>
+              </a:schemeClr>
+            </a:gs>
+          </a:gsLst>
+          <a:lin ang="16200000" scaled="0"/>
+        </a:gradFill>
+      </a:fillStyleLst>
+      <a:lnStyleLst>
+        <a:ln w="9525" cap="flat" cmpd="sng" algn="ctr">
+          <a:solidFill>
+            <a:schemeClr val="phClr">
+              <a:shade val="95000"/>
+              <a:satMod val="105000"/>
+            </a:schemeClr>
+          </a:solidFill>
+          <a:prstDash val="solid"/>
+        </a:ln>
+        <a:ln w="25400" cap="flat" cmpd="sng" algn="ctr">
+          <a:solidFill>
+            <a:schemeClr val="phClr"/>
+          </a:solidFill>
+          <a:prstDash val="solid"/>
+        </a:ln>
+        <a:ln w="38100" cap="flat" cmpd="sng" algn="ctr">
+          <a:solidFill>
+            <a:schemeClr val="phClr"/>
+          </a:solidFill>
+          <a:prstDash val="solid"/>
+        </a:ln>
+      </a:lnStyleLst>
+      <a:effectStyleLst>
+        <a:effectStyle>
+          <a:effectLst>
+            <a:outerShdw blurRad="40000" dist="20000" dir="5400000" rotWithShape="0">
+              <a:srgbClr val="000000">
+                <a:alpha val="38000"/>
+              </a:srgbClr>
+            </a:outerShdw>
+          </a:effectLst>
+        </a:effectStyle>
+        <a:effectStyle>
+          <a:effectLst>
+            <a:outerShdw blurRad="40000" dist="23000" dir="5400000" rotWithShape="0">
+              <a:srgbClr val="000000">
+                <a:alpha val="35000"/>
+              </a:srgbClr>
+            </a:outerShdw>
+          </a:effectLst>
+        </a:effectStyle>
+        <a:effectStyle>
+          <a:effectLst>
+            <a:outerShdw blurRad="40000" dist="23000" dir="5400000" rotWithShape="0">
+              <a:srgbClr val="000000">
+                <a:alpha val="35000"/>
+              </a:srgbClr>
+            </a:outerShdw>
+          </a:effectLst>
+          <a:scene3d>
+            <a:camera prst="orthographicFront">
+              <a:rot lat="0" lon="0" rev="0"/>
+            </a:camera>
+            <a:lightRig rig="threePt" dir="t">
+              <a:rot lat="0" lon="0" rev="1200000"/>
+            </a:lightRig>
+          </a:scene3d>
+          <a:sp3d>
+            <a:bevelT w="63500" h="25400"/>
+          </a:sp3d>
+        </a:effectStyle>
+      </a:effectStyleLst>
+      <a:bgFillStyleLst>
+        <a:solidFill>
+          <a:schemeClr val="phClr"/>
+        </a:solidFill>
+        <a:gradFill rotWithShape="1">
+          <a:gsLst>
+            <a:gs pos="0">
+              <a:schemeClr val="phClr">
+                <a:tint val="40000"/>
+                <a:satMod val="350000"/>
+              </a:schemeClr>
+            </a:gs>
+            <a:gs pos="40000">
+              <a:schemeClr val="phClr">
+                <a:tint val="45000"/>
+                <a:shade val="99000"/>
+                <a:satMod val="350000"/>
+              </a:schemeClr>
+            </a:gs>
+            <a:gs pos="100000">
+              <a:schemeClr val="phClr">
+                <a:shade val="20000"/>
+                <a:satMod val="255000"/>
+              </a:schemeClr>
+            </a:gs>
+          </a:gsLst>
+          <a:path path="circle">
+            <a:fillToRect l="50000" t="-80000" r="50000" b="180000"/>
+          </a:path>
+        </a:gradFill>
+        <a:gradFill rotWithShape="1">
+          <a:gsLst>
+            <a:gs pos="0">
+              <a:schemeClr val="phClr">
+                <a:tint val="80000"/>
+                <a:satMod val="300000"/>
+              </a:schemeClr>
+            </a:gs>
+            <a:gs pos="100000">
+              <a:schemeClr val="phClr">
+                <a:shade val="30000"/>
+                <a:satMod val="200000"/>
+              </a:schemeClr>
+            </a:gs>
+          </a:gsLst>
+          <a:path path="circle">
+            <a:fillToRect l="50000" t="50000" r="50000" b="50000"/>
+          </a:path>
+        </a:gradFill>
+      </a:bgFillStyleLst>
+    </a:fmtScheme>
+  </a:themeElements>
+</a:theme>
+</file>
+
+<file path=ppt/theme/theme2.xml><?xml version="1.0" encoding="utf-8"?>
 <a:theme xmlns:a="http://schemas.openxmlformats.org/drawingml/2006/main" xmlns:r="http://schemas.openxmlformats.org/officeDocument/2006/relationships" name="Custom Theme">
   <a:themeElements>
     <a:clrScheme name="Default">
@@ -7384,283 +7825,4 @@
     </a:fmtScheme>
   </a:themeElements>
 </a:theme>
-</file>
-
-<file path=ppt/theme/theme2.xml><?xml version="1.0" encoding="utf-8"?>
-<a:theme xmlns:a="http://schemas.openxmlformats.org/drawingml/2006/main" xmlns:r="http://schemas.openxmlformats.org/officeDocument/2006/relationships" name="coral">
-  <a:themeElements>
-    <a:clrScheme name="Coral">
-      <a:dk1>
-        <a:srgbClr val="F55E61"/>
-      </a:dk1>
-      <a:lt1>
-        <a:srgbClr val="FFFFFF"/>
-      </a:lt1>
-      <a:dk2>
-        <a:srgbClr val="5E696C"/>
-      </a:dk2>
-      <a:lt2>
-        <a:srgbClr val="BFC7CA"/>
-      </a:lt2>
-      <a:accent1>
-        <a:srgbClr val="1E2D31"/>
-      </a:accent1>
-      <a:accent2>
-        <a:srgbClr val="273C42"/>
-      </a:accent2>
-      <a:accent3>
-        <a:srgbClr val="83D061"/>
-      </a:accent3>
-      <a:accent4>
-        <a:srgbClr val="F6CD4C"/>
-      </a:accent4>
-      <a:accent5>
-        <a:srgbClr val="AF4345"/>
-      </a:accent5>
-      <a:accent6>
-        <a:srgbClr val="F58F8F"/>
-      </a:accent6>
-      <a:hlink>
-        <a:srgbClr val="AF4345"/>
-      </a:hlink>
-      <a:folHlink>
-        <a:srgbClr val="AF4345"/>
-      </a:folHlink>
-    </a:clrScheme>
-    <a:fontScheme name="Office">
-      <a:majorFont>
-        <a:latin typeface="Arial"/>
-        <a:ea typeface=""/>
-        <a:cs typeface=""/>
-        <a:font script="Jpan" typeface="ＭＳ Ｐゴシック"/>
-        <a:font script="Hang" typeface="맑은 고딕"/>
-        <a:font script="Hans" typeface="宋体"/>
-        <a:font script="Hant" typeface="新細明體"/>
-        <a:font script="Arab" typeface="Times New Roman"/>
-        <a:font script="Hebr" typeface="Times New Roman"/>
-        <a:font script="Thai" typeface="Angsana New"/>
-        <a:font script="Ethi" typeface="Nyala"/>
-        <a:font script="Beng" typeface="Vrinda"/>
-        <a:font script="Gujr" typeface="Shruti"/>
-        <a:font script="Khmr" typeface="MoolBoran"/>
-        <a:font script="Knda" typeface="Tunga"/>
-        <a:font script="Guru" typeface="Raavi"/>
-        <a:font script="Cans" typeface="Euphemia"/>
-        <a:font script="Cher" typeface="Plantagenet Cherokee"/>
-        <a:font script="Yiii" typeface="Microsoft Yi Baiti"/>
-        <a:font script="Tibt" typeface="Microsoft Himalaya"/>
-        <a:font script="Thaa" typeface="MV Boli"/>
-        <a:font script="Deva" typeface="Mangal"/>
-        <a:font script="Telu" typeface="Gautami"/>
-        <a:font script="Taml" typeface="Latha"/>
-        <a:font script="Syrc" typeface="Estrangelo Edessa"/>
-        <a:font script="Orya" typeface="Kalinga"/>
-        <a:font script="Mlym" typeface="Kartika"/>
-        <a:font script="Laoo" typeface="DokChampa"/>
-        <a:font script="Sinh" typeface="Iskoola Pota"/>
-        <a:font script="Mong" typeface="Mongolian Baiti"/>
-        <a:font script="Viet" typeface="Times New Roman"/>
-        <a:font script="Uigh" typeface="Microsoft Uighur"/>
-        <a:font script="Geor" typeface="Sylfaen"/>
-      </a:majorFont>
-      <a:minorFont>
-        <a:latin typeface="Arial"/>
-        <a:ea typeface=""/>
-        <a:cs typeface=""/>
-        <a:font script="Jpan" typeface="ＭＳ Ｐゴシック"/>
-        <a:font script="Hang" typeface="맑은 고딕"/>
-        <a:font script="Hans" typeface="宋体"/>
-        <a:font script="Hant" typeface="新細明體"/>
-        <a:font script="Arab" typeface="Arial"/>
-        <a:font script="Hebr" typeface="Arial"/>
-        <a:font script="Thai" typeface="Cordia New"/>
-        <a:font script="Ethi" typeface="Nyala"/>
-        <a:font script="Beng" typeface="Vrinda"/>
-        <a:font script="Gujr" typeface="Shruti"/>
-        <a:font script="Khmr" typeface="DaunPenh"/>
-        <a:font script="Knda" typeface="Tunga"/>
-        <a:font script="Guru" typeface="Raavi"/>
-        <a:font script="Cans" typeface="Euphemia"/>
-        <a:font script="Cher" typeface="Plantagenet Cherokee"/>
-        <a:font script="Yiii" typeface="Microsoft Yi Baiti"/>
-        <a:font script="Tibt" typeface="Microsoft Himalaya"/>
-        <a:font script="Thaa" typeface="MV Boli"/>
-        <a:font script="Deva" typeface="Mangal"/>
-        <a:font script="Telu" typeface="Gautami"/>
-        <a:font script="Taml" typeface="Latha"/>
-        <a:font script="Syrc" typeface="Estrangelo Edessa"/>
-        <a:font script="Orya" typeface="Kalinga"/>
-        <a:font script="Mlym" typeface="Kartika"/>
-        <a:font script="Laoo" typeface="DokChampa"/>
-        <a:font script="Sinh" typeface="Iskoola Pota"/>
-        <a:font script="Mong" typeface="Mongolian Baiti"/>
-        <a:font script="Viet" typeface="Arial"/>
-        <a:font script="Uigh" typeface="Microsoft Uighur"/>
-        <a:font script="Geor" typeface="Sylfaen"/>
-      </a:minorFont>
-    </a:fontScheme>
-    <a:fmtScheme name="Office">
-      <a:fillStyleLst>
-        <a:solidFill>
-          <a:schemeClr val="phClr"/>
-        </a:solidFill>
-        <a:gradFill rotWithShape="1">
-          <a:gsLst>
-            <a:gs pos="0">
-              <a:schemeClr val="phClr">
-                <a:tint val="50000"/>
-                <a:satMod val="300000"/>
-              </a:schemeClr>
-            </a:gs>
-            <a:gs pos="35000">
-              <a:schemeClr val="phClr">
-                <a:tint val="37000"/>
-                <a:satMod val="300000"/>
-              </a:schemeClr>
-            </a:gs>
-            <a:gs pos="100000">
-              <a:schemeClr val="phClr">
-                <a:tint val="15000"/>
-                <a:satMod val="350000"/>
-              </a:schemeClr>
-            </a:gs>
-          </a:gsLst>
-          <a:lin ang="16200000" scaled="1"/>
-        </a:gradFill>
-        <a:gradFill rotWithShape="1">
-          <a:gsLst>
-            <a:gs pos="0">
-              <a:schemeClr val="phClr">
-                <a:tint val="100000"/>
-                <a:shade val="100000"/>
-                <a:satMod val="130000"/>
-              </a:schemeClr>
-            </a:gs>
-            <a:gs pos="100000">
-              <a:schemeClr val="phClr">
-                <a:tint val="50000"/>
-                <a:shade val="100000"/>
-                <a:satMod val="350000"/>
-              </a:schemeClr>
-            </a:gs>
-          </a:gsLst>
-          <a:lin ang="16200000" scaled="0"/>
-        </a:gradFill>
-      </a:fillStyleLst>
-      <a:lnStyleLst>
-        <a:ln w="9525" cap="flat" cmpd="sng" algn="ctr">
-          <a:solidFill>
-            <a:schemeClr val="phClr">
-              <a:shade val="95000"/>
-              <a:satMod val="105000"/>
-            </a:schemeClr>
-          </a:solidFill>
-          <a:prstDash val="solid"/>
-        </a:ln>
-        <a:ln w="25400" cap="flat" cmpd="sng" algn="ctr">
-          <a:solidFill>
-            <a:schemeClr val="phClr"/>
-          </a:solidFill>
-          <a:prstDash val="solid"/>
-        </a:ln>
-        <a:ln w="38100" cap="flat" cmpd="sng" algn="ctr">
-          <a:solidFill>
-            <a:schemeClr val="phClr"/>
-          </a:solidFill>
-          <a:prstDash val="solid"/>
-        </a:ln>
-      </a:lnStyleLst>
-      <a:effectStyleLst>
-        <a:effectStyle>
-          <a:effectLst>
-            <a:outerShdw blurRad="40000" dist="20000" dir="5400000" rotWithShape="0">
-              <a:srgbClr val="000000">
-                <a:alpha val="38000"/>
-              </a:srgbClr>
-            </a:outerShdw>
-          </a:effectLst>
-        </a:effectStyle>
-        <a:effectStyle>
-          <a:effectLst>
-            <a:outerShdw blurRad="40000" dist="23000" dir="5400000" rotWithShape="0">
-              <a:srgbClr val="000000">
-                <a:alpha val="35000"/>
-              </a:srgbClr>
-            </a:outerShdw>
-          </a:effectLst>
-        </a:effectStyle>
-        <a:effectStyle>
-          <a:effectLst>
-            <a:outerShdw blurRad="40000" dist="23000" dir="5400000" rotWithShape="0">
-              <a:srgbClr val="000000">
-                <a:alpha val="35000"/>
-              </a:srgbClr>
-            </a:outerShdw>
-          </a:effectLst>
-          <a:scene3d>
-            <a:camera prst="orthographicFront">
-              <a:rot lat="0" lon="0" rev="0"/>
-            </a:camera>
-            <a:lightRig rig="threePt" dir="t">
-              <a:rot lat="0" lon="0" rev="1200000"/>
-            </a:lightRig>
-          </a:scene3d>
-          <a:sp3d>
-            <a:bevelT w="63500" h="25400"/>
-          </a:sp3d>
-        </a:effectStyle>
-      </a:effectStyleLst>
-      <a:bgFillStyleLst>
-        <a:solidFill>
-          <a:schemeClr val="phClr"/>
-        </a:solidFill>
-        <a:gradFill rotWithShape="1">
-          <a:gsLst>
-            <a:gs pos="0">
-              <a:schemeClr val="phClr">
-                <a:tint val="40000"/>
-                <a:satMod val="350000"/>
-              </a:schemeClr>
-            </a:gs>
-            <a:gs pos="40000">
-              <a:schemeClr val="phClr">
-                <a:tint val="45000"/>
-                <a:shade val="99000"/>
-                <a:satMod val="350000"/>
-              </a:schemeClr>
-            </a:gs>
-            <a:gs pos="100000">
-              <a:schemeClr val="phClr">
-                <a:shade val="20000"/>
-                <a:satMod val="255000"/>
-              </a:schemeClr>
-            </a:gs>
-          </a:gsLst>
-          <a:path path="circle">
-            <a:fillToRect l="50000" t="-80000" r="50000" b="180000"/>
-          </a:path>
-        </a:gradFill>
-        <a:gradFill rotWithShape="1">
-          <a:gsLst>
-            <a:gs pos="0">
-              <a:schemeClr val="phClr">
-                <a:tint val="80000"/>
-                <a:satMod val="300000"/>
-              </a:schemeClr>
-            </a:gs>
-            <a:gs pos="100000">
-              <a:schemeClr val="phClr">
-                <a:shade val="30000"/>
-                <a:satMod val="200000"/>
-              </a:schemeClr>
-            </a:gs>
-          </a:gsLst>
-          <a:path path="circle">
-            <a:fillToRect l="50000" t="50000" r="50000" b="50000"/>
-          </a:path>
-        </a:gradFill>
-      </a:bgFillStyleLst>
-    </a:fmtScheme>
-  </a:themeElements>
-</a:theme>
 </file>
</xml_diff>

<commit_message>
added screenshots of Part II
</commit_message>
<xml_diff>
--- a/CS347 Final Project.pptx
+++ b/CS347 Final Project.pptx
@@ -24,23 +24,24 @@
     <p:sldId id="269" r:id="rId19"/>
     <p:sldId id="270" r:id="rId20"/>
     <p:sldId id="271" r:id="rId21"/>
+    <p:sldId id="272" r:id="rId22"/>
   </p:sldIdLst>
   <p:sldSz cy="5143500" cx="9144000"/>
   <p:notesSz cx="6858000" cy="9144000"/>
   <p:embeddedFontLst>
     <p:embeddedFont>
       <p:font typeface="Playfair Display"/>
-      <p:regular r:id="rId22"/>
-      <p:bold r:id="rId23"/>
-      <p:italic r:id="rId24"/>
-      <p:boldItalic r:id="rId25"/>
+      <p:regular r:id="rId23"/>
+      <p:bold r:id="rId24"/>
+      <p:italic r:id="rId25"/>
+      <p:boldItalic r:id="rId26"/>
     </p:embeddedFont>
     <p:embeddedFont>
       <p:font typeface="Lato"/>
-      <p:regular r:id="rId26"/>
-      <p:bold r:id="rId27"/>
-      <p:italic r:id="rId28"/>
-      <p:boldItalic r:id="rId29"/>
+      <p:regular r:id="rId27"/>
+      <p:bold r:id="rId28"/>
+      <p:italic r:id="rId29"/>
+      <p:boldItalic r:id="rId30"/>
     </p:embeddedFont>
   </p:embeddedFontLst>
   <p:defaultTextStyle>
@@ -936,7 +937,7 @@
   <p:cSld>
     <p:spTree>
       <p:nvGrpSpPr>
-        <p:cNvPr id="124" name="Shape 124"/>
+        <p:cNvPr id="126" name="Shape 126"/>
         <p:cNvGrpSpPr/>
         <p:nvPr/>
       </p:nvGrpSpPr>
@@ -950,7 +951,7 @@
       </p:grpSpPr>
       <p:sp>
         <p:nvSpPr>
-          <p:cNvPr id="125" name="Shape 125"/>
+          <p:cNvPr id="127" name="Shape 127"/>
           <p:cNvSpPr/>
           <p:nvPr>
             <p:ph idx="2" type="sldImg"/>
@@ -994,7 +995,7 @@
       </p:sp>
       <p:sp>
         <p:nvSpPr>
-          <p:cNvPr id="126" name="Shape 126"/>
+          <p:cNvPr id="128" name="Shape 128"/>
           <p:cNvSpPr txBox="1"/>
           <p:nvPr>
             <p:ph idx="1" type="body"/>
@@ -1041,7 +1042,7 @@
   <p:cSld>
     <p:spTree>
       <p:nvGrpSpPr>
-        <p:cNvPr id="131" name="Shape 131"/>
+        <p:cNvPr id="133" name="Shape 133"/>
         <p:cNvGrpSpPr/>
         <p:nvPr/>
       </p:nvGrpSpPr>
@@ -1055,7 +1056,7 @@
       </p:grpSpPr>
       <p:sp>
         <p:nvSpPr>
-          <p:cNvPr id="132" name="Shape 132"/>
+          <p:cNvPr id="134" name="Shape 134"/>
           <p:cNvSpPr/>
           <p:nvPr>
             <p:ph idx="2" type="sldImg"/>
@@ -1099,7 +1100,7 @@
       </p:sp>
       <p:sp>
         <p:nvSpPr>
-          <p:cNvPr id="133" name="Shape 133"/>
+          <p:cNvPr id="135" name="Shape 135"/>
           <p:cNvSpPr txBox="1"/>
           <p:nvPr>
             <p:ph idx="1" type="body"/>
@@ -1146,7 +1147,7 @@
   <p:cSld>
     <p:spTree>
       <p:nvGrpSpPr>
-        <p:cNvPr id="136" name="Shape 136"/>
+        <p:cNvPr id="140" name="Shape 140"/>
         <p:cNvGrpSpPr/>
         <p:nvPr/>
       </p:nvGrpSpPr>
@@ -1160,7 +1161,7 @@
       </p:grpSpPr>
       <p:sp>
         <p:nvSpPr>
-          <p:cNvPr id="137" name="Shape 137"/>
+          <p:cNvPr id="141" name="Shape 141"/>
           <p:cNvSpPr/>
           <p:nvPr>
             <p:ph idx="2" type="sldImg"/>
@@ -1204,7 +1205,112 @@
       </p:sp>
       <p:sp>
         <p:nvSpPr>
-          <p:cNvPr id="138" name="Shape 138"/>
+          <p:cNvPr id="142" name="Shape 142"/>
+          <p:cNvSpPr txBox="1"/>
+          <p:nvPr>
+            <p:ph idx="1" type="body"/>
+          </p:nvPr>
+        </p:nvSpPr>
+        <p:spPr>
+          <a:xfrm>
+            <a:off x="685800" y="4343400"/>
+            <a:ext cx="5486399" cy="4114800"/>
+          </a:xfrm>
+          <a:prstGeom prst="rect">
+            <a:avLst/>
+          </a:prstGeom>
+        </p:spPr>
+        <p:txBody>
+          <a:bodyPr anchorCtr="0" anchor="t" bIns="91425" lIns="91425" rIns="91425" tIns="91425">
+            <a:noAutofit/>
+          </a:bodyPr>
+          <a:lstStyle/>
+          <a:p>
+            <a:pPr>
+              <a:spcBef>
+                <a:spcPts val="0"/>
+              </a:spcBef>
+              <a:buNone/>
+            </a:pPr>
+            <a:r>
+              <a:t/>
+            </a:r>
+            <a:endParaRPr/>
+          </a:p>
+        </p:txBody>
+      </p:sp>
+    </p:spTree>
+  </p:cSld>
+  <p:clrMapOvr>
+    <a:masterClrMapping/>
+  </p:clrMapOvr>
+</p:notes>
+</file>
+
+<file path=ppt/notesSlides/notesSlide17.xml><?xml version="1.0" encoding="utf-8"?>
+<p:notes xmlns:a="http://schemas.openxmlformats.org/drawingml/2006/main" xmlns:r="http://schemas.openxmlformats.org/officeDocument/2006/relationships" xmlns:mc="http://schemas.openxmlformats.org/markup-compatibility/2006" xmlns:mv="urn:schemas-microsoft-com:mac:vml" xmlns:p="http://schemas.openxmlformats.org/presentationml/2006/main" xmlns:c="http://schemas.openxmlformats.org/drawingml/2006/chart" xmlns:dgm="http://schemas.openxmlformats.org/drawingml/2006/diagram" xmlns:o="urn:schemas-microsoft-com:office:office" xmlns:v="urn:schemas-microsoft-com:vml" xmlns:pvml="urn:schemas-microsoft-com:office:powerpoint" xmlns:com="http://schemas.openxmlformats.org/drawingml/2006/compatibility" xmlns:p14="http://schemas.microsoft.com/office/powerpoint/2010/main" showMasterPhAnim="0" showMasterSp="0">
+  <p:cSld>
+    <p:spTree>
+      <p:nvGrpSpPr>
+        <p:cNvPr id="145" name="Shape 145"/>
+        <p:cNvGrpSpPr/>
+        <p:nvPr/>
+      </p:nvGrpSpPr>
+      <p:grpSpPr>
+        <a:xfrm>
+          <a:off x="0" y="0"/>
+          <a:ext cx="0" cy="0"/>
+          <a:chOff x="0" y="0"/>
+          <a:chExt cx="0" cy="0"/>
+        </a:xfrm>
+      </p:grpSpPr>
+      <p:sp>
+        <p:nvSpPr>
+          <p:cNvPr id="146" name="Shape 146"/>
+          <p:cNvSpPr/>
+          <p:nvPr>
+            <p:ph idx="2" type="sldImg"/>
+          </p:nvPr>
+        </p:nvSpPr>
+        <p:spPr>
+          <a:xfrm>
+            <a:off x="381300" y="685800"/>
+            <a:ext cx="6096000" cy="3429000"/>
+          </a:xfrm>
+          <a:custGeom>
+            <a:pathLst>
+              <a:path extrusionOk="0" h="120000" w="120000">
+                <a:moveTo>
+                  <a:pt x="0" y="0"/>
+                </a:moveTo>
+                <a:lnTo>
+                  <a:pt x="120000" y="0"/>
+                </a:lnTo>
+                <a:lnTo>
+                  <a:pt x="120000" y="120000"/>
+                </a:lnTo>
+                <a:lnTo>
+                  <a:pt x="0" y="120000"/>
+                </a:lnTo>
+                <a:close/>
+              </a:path>
+            </a:pathLst>
+          </a:custGeom>
+          <a:noFill/>
+          <a:ln cap="flat" cmpd="sng" w="9525">
+            <a:solidFill>
+              <a:srgbClr val="000000"/>
+            </a:solidFill>
+            <a:prstDash val="solid"/>
+            <a:round/>
+            <a:headEnd len="med" w="med" type="none"/>
+            <a:tailEnd len="med" w="med" type="none"/>
+          </a:ln>
+        </p:spPr>
+      </p:sp>
+      <p:sp>
+        <p:nvSpPr>
+          <p:cNvPr id="147" name="Shape 147"/>
           <p:cNvSpPr txBox="1"/>
           <p:nvPr>
             <p:ph idx="1" type="body"/>
@@ -6593,8 +6699,8 @@
         </p:blipFill>
         <p:spPr>
           <a:xfrm>
-            <a:off x="0" y="560916"/>
-            <a:ext cx="9144000" cy="4021666"/>
+            <a:off x="837375" y="205600"/>
+            <a:ext cx="2257975" cy="4732298"/>
           </a:xfrm>
           <a:prstGeom prst="rect">
             <a:avLst/>
@@ -6605,6 +6711,94 @@
           </a:ln>
         </p:spPr>
       </p:pic>
+      <p:pic>
+        <p:nvPicPr>
+          <p:cNvPr id="124" name="Shape 124"/>
+          <p:cNvPicPr preferRelativeResize="0"/>
+          <p:nvPr/>
+        </p:nvPicPr>
+        <p:blipFill>
+          <a:blip r:embed="rId4">
+            <a:alphaModFix/>
+          </a:blip>
+          <a:stretch>
+            <a:fillRect/>
+          </a:stretch>
+        </p:blipFill>
+        <p:spPr>
+          <a:xfrm>
+            <a:off x="1011125" y="870387"/>
+            <a:ext cx="1910474" cy="3402724"/>
+          </a:xfrm>
+          <a:prstGeom prst="rect">
+            <a:avLst/>
+          </a:prstGeom>
+          <a:noFill/>
+          <a:ln>
+            <a:noFill/>
+          </a:ln>
+        </p:spPr>
+      </p:pic>
+      <p:sp>
+        <p:nvSpPr>
+          <p:cNvPr id="125" name="Shape 125"/>
+          <p:cNvSpPr txBox="1"/>
+          <p:nvPr>
+            <p:ph type="title"/>
+          </p:nvPr>
+        </p:nvSpPr>
+        <p:spPr>
+          <a:xfrm>
+            <a:off x="3999475" y="870400"/>
+            <a:ext cx="4152599" cy="2216700"/>
+          </a:xfrm>
+          <a:prstGeom prst="rect">
+            <a:avLst/>
+          </a:prstGeom>
+        </p:spPr>
+        <p:txBody>
+          <a:bodyPr anchorCtr="0" anchor="t" bIns="91425" lIns="91425" rIns="91425" tIns="91425">
+            <a:noAutofit/>
+          </a:bodyPr>
+          <a:lstStyle/>
+          <a:p>
+            <a:pPr rtl="0">
+              <a:spcBef>
+                <a:spcPts val="0"/>
+              </a:spcBef>
+              <a:buNone/>
+            </a:pPr>
+            <a:r>
+              <a:rPr lang="en"/>
+              <a:t>Drink Recipes </a:t>
+            </a:r>
+          </a:p>
+          <a:p>
+            <a:pPr rtl="0">
+              <a:spcBef>
+                <a:spcPts val="0"/>
+              </a:spcBef>
+              <a:buNone/>
+            </a:pPr>
+            <a:r>
+              <a:t/>
+            </a:r>
+            <a:endParaRPr/>
+          </a:p>
+          <a:p>
+            <a:pPr>
+              <a:spcBef>
+                <a:spcPts val="0"/>
+              </a:spcBef>
+              <a:buNone/>
+            </a:pPr>
+            <a:r>
+              <a:rPr lang="en" sz="2400"/>
+              <a:t>Returns ingredients and directions</a:t>
+            </a:r>
+          </a:p>
+        </p:txBody>
+      </p:sp>
     </p:spTree>
   </p:cSld>
   <p:clrMapOvr>
@@ -6621,7 +6815,7 @@
   <p:cSld>
     <p:spTree>
       <p:nvGrpSpPr>
-        <p:cNvPr id="127" name="Shape 127"/>
+        <p:cNvPr id="129" name="Shape 129"/>
         <p:cNvGrpSpPr/>
         <p:nvPr/>
       </p:nvGrpSpPr>
@@ -6635,7 +6829,7 @@
       </p:grpSpPr>
       <p:sp>
         <p:nvSpPr>
-          <p:cNvPr id="128" name="Shape 128"/>
+          <p:cNvPr id="130" name="Shape 130"/>
           <p:cNvSpPr txBox="1"/>
           <p:nvPr>
             <p:ph type="title"/>
@@ -6643,8 +6837,8 @@
         </p:nvSpPr>
         <p:spPr>
           <a:xfrm>
-            <a:off x="311700" y="391350"/>
-            <a:ext cx="8520599" cy="626100"/>
+            <a:off x="724150" y="1275300"/>
+            <a:ext cx="4528500" cy="2592900"/>
           </a:xfrm>
           <a:prstGeom prst="rect">
             <a:avLst/>
@@ -6656,7 +6850,19 @@
           </a:bodyPr>
           <a:lstStyle/>
           <a:p>
-            <a:pPr>
+            <a:pPr rtl="0" algn="r">
+              <a:spcBef>
+                <a:spcPts val="0"/>
+              </a:spcBef>
+              <a:buNone/>
+            </a:pPr>
+            <a:r>
+              <a:rPr lang="en"/>
+              <a:t>Drink Menu</a:t>
+            </a:r>
+          </a:p>
+          <a:p>
+            <a:pPr rtl="0" algn="r">
               <a:spcBef>
                 <a:spcPts val="0"/>
               </a:spcBef>
@@ -6667,47 +6873,23 @@
             </a:r>
             <a:endParaRPr/>
           </a:p>
-        </p:txBody>
-      </p:sp>
-      <p:sp>
-        <p:nvSpPr>
-          <p:cNvPr id="129" name="Shape 129"/>
-          <p:cNvSpPr txBox="1"/>
-          <p:nvPr>
-            <p:ph idx="1" type="body"/>
-          </p:nvPr>
-        </p:nvSpPr>
-        <p:spPr>
-          <a:xfrm>
-            <a:off x="311700" y="1152475"/>
-            <a:ext cx="8520599" cy="3416400"/>
-          </a:xfrm>
-          <a:prstGeom prst="rect">
-            <a:avLst/>
-          </a:prstGeom>
-        </p:spPr>
-        <p:txBody>
-          <a:bodyPr anchorCtr="0" anchor="t" bIns="91425" lIns="91425" rIns="91425" tIns="91425">
-            <a:noAutofit/>
-          </a:bodyPr>
-          <a:lstStyle/>
           <a:p>
-            <a:pPr>
+            <a:pPr algn="r">
               <a:spcBef>
                 <a:spcPts val="0"/>
               </a:spcBef>
               <a:buNone/>
             </a:pPr>
             <a:r>
-              <a:t/>
+              <a:rPr lang="en" sz="2400"/>
+              <a:t>Lists price, description, and corresponding season</a:t>
             </a:r>
-            <a:endParaRPr/>
           </a:p>
         </p:txBody>
       </p:sp>
       <p:pic>
         <p:nvPicPr>
-          <p:cNvPr id="130" name="Shape 130"/>
+          <p:cNvPr id="131" name="Shape 131"/>
           <p:cNvPicPr preferRelativeResize="0"/>
           <p:nvPr/>
         </p:nvPicPr>
@@ -6721,8 +6903,36 @@
         </p:blipFill>
         <p:spPr>
           <a:xfrm>
-            <a:off x="0" y="205725"/>
-            <a:ext cx="9144000" cy="4732049"/>
+            <a:off x="6100050" y="350524"/>
+            <a:ext cx="2015499" cy="4224101"/>
+          </a:xfrm>
+          <a:prstGeom prst="rect">
+            <a:avLst/>
+          </a:prstGeom>
+          <a:noFill/>
+          <a:ln>
+            <a:noFill/>
+          </a:ln>
+        </p:spPr>
+      </p:pic>
+      <p:pic>
+        <p:nvPicPr>
+          <p:cNvPr id="132" name="Shape 132"/>
+          <p:cNvPicPr preferRelativeResize="0"/>
+          <p:nvPr/>
+        </p:nvPicPr>
+        <p:blipFill>
+          <a:blip r:embed="rId4">
+            <a:alphaModFix/>
+          </a:blip>
+          <a:stretch>
+            <a:fillRect/>
+          </a:stretch>
+        </p:blipFill>
+        <p:spPr>
+          <a:xfrm>
+            <a:off x="6266022" y="950500"/>
+            <a:ext cx="1697300" cy="3023025"/>
           </a:xfrm>
           <a:prstGeom prst="rect">
             <a:avLst/>
@@ -6749,7 +6959,7 @@
   <p:cSld>
     <p:spTree>
       <p:nvGrpSpPr>
-        <p:cNvPr id="134" name="Shape 134"/>
+        <p:cNvPr id="136" name="Shape 136"/>
         <p:cNvGrpSpPr/>
         <p:nvPr/>
       </p:nvGrpSpPr>
@@ -6763,7 +6973,151 @@
       </p:grpSpPr>
       <p:sp>
         <p:nvSpPr>
-          <p:cNvPr id="135" name="Shape 135"/>
+          <p:cNvPr id="137" name="Shape 137"/>
+          <p:cNvSpPr txBox="1"/>
+          <p:nvPr>
+            <p:ph type="title"/>
+          </p:nvPr>
+        </p:nvSpPr>
+        <p:spPr>
+          <a:xfrm>
+            <a:off x="4157175" y="1093350"/>
+            <a:ext cx="4734899" cy="2956799"/>
+          </a:xfrm>
+          <a:prstGeom prst="rect">
+            <a:avLst/>
+          </a:prstGeom>
+        </p:spPr>
+        <p:txBody>
+          <a:bodyPr anchorCtr="0" anchor="t" bIns="91425" lIns="91425" rIns="91425" tIns="91425">
+            <a:noAutofit/>
+          </a:bodyPr>
+          <a:lstStyle/>
+          <a:p>
+            <a:pPr rtl="0">
+              <a:spcBef>
+                <a:spcPts val="0"/>
+              </a:spcBef>
+              <a:buNone/>
+            </a:pPr>
+            <a:r>
+              <a:rPr lang="en"/>
+              <a:t>Seasons</a:t>
+            </a:r>
+          </a:p>
+          <a:p>
+            <a:pPr rtl="0">
+              <a:spcBef>
+                <a:spcPts val="0"/>
+              </a:spcBef>
+              <a:buNone/>
+            </a:pPr>
+            <a:r>
+              <a:t/>
+            </a:r>
+            <a:endParaRPr/>
+          </a:p>
+          <a:p>
+            <a:pPr>
+              <a:spcBef>
+                <a:spcPts val="0"/>
+              </a:spcBef>
+              <a:buNone/>
+            </a:pPr>
+            <a:r>
+              <a:rPr lang="en" sz="2400"/>
+              <a:t>Table information defining our different seasons</a:t>
+            </a:r>
+          </a:p>
+        </p:txBody>
+      </p:sp>
+      <p:pic>
+        <p:nvPicPr>
+          <p:cNvPr id="138" name="Shape 138"/>
+          <p:cNvPicPr preferRelativeResize="0"/>
+          <p:nvPr/>
+        </p:nvPicPr>
+        <p:blipFill>
+          <a:blip r:embed="rId3">
+            <a:alphaModFix/>
+          </a:blip>
+          <a:stretch>
+            <a:fillRect/>
+          </a:stretch>
+        </p:blipFill>
+        <p:spPr>
+          <a:xfrm>
+            <a:off x="1169450" y="431174"/>
+            <a:ext cx="2015499" cy="4224101"/>
+          </a:xfrm>
+          <a:prstGeom prst="rect">
+            <a:avLst/>
+          </a:prstGeom>
+          <a:noFill/>
+          <a:ln>
+            <a:noFill/>
+          </a:ln>
+        </p:spPr>
+      </p:pic>
+      <p:pic>
+        <p:nvPicPr>
+          <p:cNvPr id="139" name="Shape 139"/>
+          <p:cNvPicPr preferRelativeResize="0"/>
+          <p:nvPr/>
+        </p:nvPicPr>
+        <p:blipFill>
+          <a:blip r:embed="rId4">
+            <a:alphaModFix/>
+          </a:blip>
+          <a:stretch>
+            <a:fillRect/>
+          </a:stretch>
+        </p:blipFill>
+        <p:spPr>
+          <a:xfrm>
+            <a:off x="1305762" y="991125"/>
+            <a:ext cx="1742875" cy="3104200"/>
+          </a:xfrm>
+          <a:prstGeom prst="rect">
+            <a:avLst/>
+          </a:prstGeom>
+          <a:noFill/>
+          <a:ln>
+            <a:noFill/>
+          </a:ln>
+        </p:spPr>
+      </p:pic>
+    </p:spTree>
+  </p:cSld>
+  <p:clrMapOvr>
+    <a:masterClrMapping/>
+  </p:clrMapOvr>
+  <p:transition spd="slow">
+    <p:cut/>
+  </p:transition>
+</p:sld>
+</file>
+
+<file path=ppt/slides/slide17.xml><?xml version="1.0" encoding="utf-8"?>
+<p:sld xmlns:a="http://schemas.openxmlformats.org/drawingml/2006/main" xmlns:r="http://schemas.openxmlformats.org/officeDocument/2006/relationships" xmlns:mc="http://schemas.openxmlformats.org/markup-compatibility/2006" xmlns:mv="urn:schemas-microsoft-com:mac:vml" xmlns:p="http://schemas.openxmlformats.org/presentationml/2006/main" xmlns:c="http://schemas.openxmlformats.org/drawingml/2006/chart" xmlns:dgm="http://schemas.openxmlformats.org/drawingml/2006/diagram" xmlns:o="urn:schemas-microsoft-com:office:office" xmlns:v="urn:schemas-microsoft-com:vml" xmlns:pvml="urn:schemas-microsoft-com:office:powerpoint" xmlns:com="http://schemas.openxmlformats.org/drawingml/2006/compatibility" xmlns:p14="http://schemas.microsoft.com/office/powerpoint/2010/main">
+  <p:cSld>
+    <p:spTree>
+      <p:nvGrpSpPr>
+        <p:cNvPr id="143" name="Shape 143"/>
+        <p:cNvGrpSpPr/>
+        <p:nvPr/>
+      </p:nvGrpSpPr>
+      <p:grpSpPr>
+        <a:xfrm>
+          <a:off x="0" y="0"/>
+          <a:ext cx="0" cy="0"/>
+          <a:chOff x="0" y="0"/>
+          <a:chExt cx="0" cy="0"/>
+        </a:xfrm>
+      </p:grpSpPr>
+      <p:sp>
+        <p:nvSpPr>
+          <p:cNvPr id="144" name="Shape 144"/>
           <p:cNvSpPr txBox="1"/>
           <p:nvPr>
             <p:ph type="title"/>

</xml_diff>